<commit_message>
Added RhinoMocks to async unit testing.
</commit_message>
<xml_diff>
--- a/Async Unit Testing/Async Unit Testing - 16.9.pptx
+++ b/Async Unit Testing/Async Unit Testing - 16.9.pptx
@@ -288,7 +288,7 @@
           <a:p>
             <a:fld id="{574E8BCA-0B4F-4373-B78E-3D2899449797}" type="datetimeFigureOut">
               <a:rPr lang="en-US" smtClean="0"/>
-              <a:t>8/11/2015</a:t>
+              <a:t>10/29/2015</a:t>
             </a:fld>
             <a:endParaRPr lang="en-US" dirty="0"/>
           </a:p>
@@ -6722,7 +6722,7 @@
           <a:p>
             <a:fld id="{1906F911-B8F3-1042-B226-54911C0C3F55}" type="datetimeFigureOut">
               <a:rPr lang="en-US" smtClean="0"/>
-              <a:t>8/11/2015</a:t>
+              <a:t>10/29/2015</a:t>
             </a:fld>
             <a:endParaRPr lang="en-US"/>
           </a:p>
@@ -12391,11 +12391,7 @@
             </a:r>
             <a:r>
               <a:rPr lang="en-US" dirty="0" smtClean="0"/>
-              <a:t>, </a:t>
-            </a:r>
-            <a:r>
-              <a:rPr lang="en-US" dirty="0" smtClean="0"/>
-              <a:t>2015</a:t>
+              <a:t>, 2015</a:t>
             </a:r>
             <a:br>
               <a:rPr lang="en-US" dirty="0" smtClean="0"/>
@@ -12484,7 +12480,7 @@
         </p:nvSpPr>
         <p:spPr>
           <a:xfrm>
-            <a:off x="7124773" y="343295"/>
+            <a:off x="8110004" y="632333"/>
             <a:ext cx="3896259" cy="627864"/>
           </a:xfrm>
           <a:prstGeom prst="rect">
@@ -12493,12 +12489,12 @@
           <a:noFill/>
         </p:spPr>
         <p:txBody>
-          <a:bodyPr wrap="none" lIns="182880" tIns="146304" rIns="182880" bIns="146304" rtlCol="0">
+          <a:bodyPr wrap="square" lIns="182880" tIns="146304" rIns="182880" bIns="146304" rtlCol="0">
             <a:spAutoFit/>
           </a:bodyPr>
           <a:lstStyle/>
           <a:p>
-            <a:pPr>
+            <a:pPr algn="r">
               <a:lnSpc>
                 <a:spcPct val="90000"/>
               </a:lnSpc>
@@ -12565,8 +12561,8 @@
         </p:nvSpPr>
         <p:spPr>
           <a:xfrm>
-            <a:off x="6198108" y="5301209"/>
-            <a:ext cx="5749587" cy="627864"/>
+            <a:off x="4420147" y="5355504"/>
+            <a:ext cx="7586116" cy="627864"/>
           </a:xfrm>
           <a:prstGeom prst="rect">
             <a:avLst/>
@@ -12579,7 +12575,7 @@
           </a:bodyPr>
           <a:lstStyle/>
           <a:p>
-            <a:pPr>
+            <a:pPr algn="r">
               <a:lnSpc>
                 <a:spcPct val="90000"/>
               </a:lnSpc>
@@ -12643,6 +12639,22 @@
               </a:rPr>
               <a:t>Typemock</a:t>
             </a:r>
+            <a:r>
+              <a:rPr lang="en-US" sz="2400" dirty="0" smtClean="0">
+                <a:solidFill>
+                  <a:schemeClr val="accent1"/>
+                </a:solidFill>
+              </a:rPr>
+              <a:t>, </a:t>
+            </a:r>
+            <a:r>
+              <a:rPr lang="en-US" sz="2400" dirty="0" err="1" smtClean="0">
+                <a:solidFill>
+                  <a:schemeClr val="accent1"/>
+                </a:solidFill>
+              </a:rPr>
+              <a:t>RhinoMocks</a:t>
+            </a:r>
             <a:endParaRPr lang="en-US" sz="2400" dirty="0" smtClean="0">
               <a:solidFill>
                 <a:schemeClr val="accent1"/>
@@ -12659,7 +12671,7 @@
         </p:nvSpPr>
         <p:spPr>
           <a:xfrm>
-            <a:off x="7069660" y="5830310"/>
+            <a:off x="7999782" y="5842061"/>
             <a:ext cx="4006481" cy="627864"/>
           </a:xfrm>
           <a:prstGeom prst="rect">
@@ -12673,7 +12685,7 @@
           </a:bodyPr>
           <a:lstStyle/>
           <a:p>
-            <a:pPr>
+            <a:pPr algn="r">
               <a:lnSpc>
                 <a:spcPct val="90000"/>
               </a:lnSpc>
@@ -16237,7 +16249,7 @@
         <p:spPr>
           <a:xfrm>
             <a:off x="269239" y="1197322"/>
-            <a:ext cx="11653522" cy="3370987"/>
+            <a:ext cx="11653522" cy="5013937"/>
           </a:xfrm>
         </p:spPr>
         <p:txBody>
@@ -16261,18 +16273,24 @@
               <a:rPr lang="en-US" dirty="0" err="1" smtClean="0"/>
               <a:t>Moq</a:t>
             </a:r>
-            <a:r>
-              <a:rPr lang="en-US" dirty="0" smtClean="0"/>
-              <a:t>, </a:t>
-            </a:r>
+            <a:endParaRPr lang="en-US" dirty="0" smtClean="0"/>
+          </a:p>
+          <a:p>
+            <a:pPr marL="457200" indent="-457200">
+              <a:buFont typeface="Arial" panose="020B0604020202020204" pitchFamily="34" charset="0"/>
+              <a:buChar char="•"/>
+            </a:pPr>
             <a:r>
               <a:rPr lang="en-US" dirty="0" err="1" smtClean="0"/>
               <a:t>FakeItEasy</a:t>
             </a:r>
-            <a:r>
-              <a:rPr lang="en-US" dirty="0" smtClean="0"/>
-              <a:t>, </a:t>
-            </a:r>
+            <a:endParaRPr lang="en-US" dirty="0" smtClean="0"/>
+          </a:p>
+          <a:p>
+            <a:pPr marL="457200" indent="-457200">
+              <a:buFont typeface="Arial" panose="020B0604020202020204" pitchFamily="34" charset="0"/>
+              <a:buChar char="•"/>
+            </a:pPr>
             <a:r>
               <a:rPr lang="en-US" dirty="0" err="1" smtClean="0"/>
               <a:t>NSubstitute</a:t>
@@ -16299,7 +16317,21 @@
             </a:pPr>
             <a:r>
               <a:rPr lang="en-US" dirty="0" smtClean="0"/>
-              <a:t>MS Stubs</a:t>
+              <a:t>MS </a:t>
+            </a:r>
+            <a:r>
+              <a:rPr lang="en-US" dirty="0" smtClean="0"/>
+              <a:t>Stubs</a:t>
+            </a:r>
+          </a:p>
+          <a:p>
+            <a:pPr marL="457200" indent="-457200">
+              <a:buFont typeface="Arial" panose="020B0604020202020204" pitchFamily="34" charset="0"/>
+              <a:buChar char="•"/>
+            </a:pPr>
+            <a:r>
+              <a:rPr lang="en-US" dirty="0" err="1" smtClean="0"/>
+              <a:t>RhinoMocks</a:t>
             </a:r>
             <a:endParaRPr lang="en-US" dirty="0"/>
           </a:p>

</xml_diff>